<commit_message>
Updates to describe which Vignettes to read first
</commit_message>
<xml_diff>
--- a/documentation/IF NEW START HERE.pptx
+++ b/documentation/IF NEW START HERE.pptx
@@ -7,14 +7,15 @@
     <p:sldMasterId id="2147483652" r:id="rId3"/>
   </p:sldMasterIdLst>
   <p:notesMasterIdLst>
-    <p:notesMasterId r:id="rId9"/>
+    <p:notesMasterId r:id="rId10"/>
   </p:notesMasterIdLst>
   <p:sldIdLst>
     <p:sldId id="259" r:id="rId4"/>
     <p:sldId id="279" r:id="rId5"/>
     <p:sldId id="260" r:id="rId6"/>
-    <p:sldId id="283" r:id="rId7"/>
-    <p:sldId id="282" r:id="rId8"/>
+    <p:sldId id="284" r:id="rId7"/>
+    <p:sldId id="283" r:id="rId8"/>
+    <p:sldId id="282" r:id="rId9"/>
   </p:sldIdLst>
   <p:sldSz cx="9144000" cy="6858000" type="screen4x3"/>
   <p:notesSz cx="6858000" cy="9144000"/>
@@ -214,7 +215,7 @@
           <a:p>
             <a:fld id="{9E37E260-6440-4804-B65E-C0FDFD91F4D0}" type="datetimeFigureOut">
               <a:rPr lang="en-US" smtClean="0"/>
-              <a:t>8/28/2017</a:t>
+              <a:t>9/14/2017</a:t>
             </a:fld>
             <a:endParaRPr lang="en-US"/>
           </a:p>
@@ -5126,13 +5127,7 @@
               <a:rPr lang="en-US" dirty="0" smtClean="0">
                 <a:latin typeface="Trebuchet MS" panose="020B0603020202020204" pitchFamily="34" charset="0"/>
               </a:rPr>
-              <a:t>There are 3 kinds of documentation to help you.  Vignettes, Slide Decks, and Manual </a:t>
-            </a:r>
-            <a:r>
-              <a:rPr lang="en-US" dirty="0" smtClean="0">
-                <a:latin typeface="Trebuchet MS" panose="020B0603020202020204" pitchFamily="34" charset="0"/>
-              </a:rPr>
-              <a:t>Files</a:t>
+              <a:t>There are 3 kinds of documentation to help you.  Vignettes, Slide Decks, and Manual Files</a:t>
             </a:r>
           </a:p>
           <a:p>
@@ -5544,12 +5539,6 @@
               </a:rPr>
               <a:t>Documentation Available:</a:t>
             </a:r>
-            <a:endParaRPr lang="en-US" dirty="0">
-              <a:solidFill>
-                <a:schemeClr val="accent3"/>
-              </a:solidFill>
-              <a:latin typeface="Trebuchet MS" panose="020B0603020202020204" pitchFamily="34" charset="0"/>
-            </a:endParaRPr>
           </a:p>
         </p:txBody>
       </p:sp>
@@ -5630,7 +5619,18 @@
                 <a:ea typeface="Segoe UI" panose="020B0502040204020203" pitchFamily="34" charset="0"/>
                 <a:cs typeface="Segoe UI" panose="020B0502040204020203" pitchFamily="34" charset="0"/>
               </a:rPr>
-              <a:t>.  They are the .html files.</a:t>
+              <a:t>.  They are the .html files</a:t>
+            </a:r>
+            <a:r>
+              <a:rPr lang="en-US" dirty="0" smtClean="0">
+                <a:solidFill>
+                  <a:schemeClr val="tx2"/>
+                </a:solidFill>
+                <a:latin typeface="Segoe UI" panose="020B0502040204020203" pitchFamily="34" charset="0"/>
+                <a:ea typeface="Segoe UI" panose="020B0502040204020203" pitchFamily="34" charset="0"/>
+                <a:cs typeface="Segoe UI" panose="020B0502040204020203" pitchFamily="34" charset="0"/>
+              </a:rPr>
+              <a:t>.</a:t>
             </a:r>
           </a:p>
         </p:txBody>
@@ -5866,38 +5866,14 @@
           <a:lstStyle/>
           <a:p>
             <a:r>
-              <a:rPr lang="en-US" dirty="0" smtClean="0">
+              <a:rPr lang="en-US" dirty="0">
                 <a:solidFill>
                   <a:schemeClr val="accent3"/>
                 </a:solidFill>
                 <a:latin typeface="Trebuchet MS" panose="020B0603020202020204" pitchFamily="34" charset="0"/>
               </a:rPr>
-              <a:t>Documentation </a:t>
-            </a:r>
-            <a:r>
-              <a:rPr lang="en-US" dirty="0">
-                <a:solidFill>
-                  <a:schemeClr val="accent3"/>
-                </a:solidFill>
-                <a:latin typeface="Trebuchet MS" panose="020B0603020202020204" pitchFamily="34" charset="0"/>
-              </a:rPr>
-              <a:t>Available</a:t>
-            </a:r>
-            <a:r>
-              <a:rPr lang="en-US" dirty="0" smtClean="0">
-                <a:solidFill>
-                  <a:schemeClr val="accent3"/>
-                </a:solidFill>
-                <a:latin typeface="Trebuchet MS" panose="020B0603020202020204" pitchFamily="34" charset="0"/>
-              </a:rPr>
-              <a:t>:</a:t>
-            </a:r>
-            <a:endParaRPr lang="en-US" dirty="0">
-              <a:solidFill>
-                <a:schemeClr val="accent3"/>
-              </a:solidFill>
-              <a:latin typeface="Trebuchet MS" panose="020B0603020202020204" pitchFamily="34" charset="0"/>
-            </a:endParaRPr>
+              <a:t>Documentation Available:</a:t>
+            </a:r>
           </a:p>
         </p:txBody>
       </p:sp>
@@ -5913,8 +5889,8 @@
         </p:nvSpPr>
         <p:spPr>
           <a:xfrm>
-            <a:off x="659305" y="2187147"/>
-            <a:ext cx="8076956" cy="4275976"/>
+            <a:off x="659305" y="2188133"/>
+            <a:ext cx="8076956" cy="4015497"/>
           </a:xfrm>
         </p:spPr>
         <p:txBody>
@@ -5922,7 +5898,7 @@
           <a:lstStyle/>
           <a:p>
             <a:r>
-              <a:rPr lang="en-US" dirty="0">
+              <a:rPr lang="en-US" dirty="0" smtClean="0">
                 <a:solidFill>
                   <a:schemeClr val="tx2"/>
                 </a:solidFill>
@@ -5930,10 +5906,8 @@
                 <a:ea typeface="Segoe UI" panose="020B0502040204020203" pitchFamily="34" charset="0"/>
                 <a:cs typeface="Segoe UI" panose="020B0502040204020203" pitchFamily="34" charset="0"/>
               </a:rPr>
-              <a:t>Manual Files are documentation for programmers looking to extend the tools, or for power users who want to understand what each function does, better.</a:t>
-            </a:r>
-          </a:p>
-          <a:p>
+              <a:t>To do word-counting, you need only read “</a:t>
+            </a:r>
             <a:r>
               <a:rPr lang="en-US" dirty="0">
                 <a:solidFill>
@@ -5943,12 +5917,10 @@
                 <a:ea typeface="Segoe UI" panose="020B0502040204020203" pitchFamily="34" charset="0"/>
                 <a:cs typeface="Segoe UI" panose="020B0502040204020203" pitchFamily="34" charset="0"/>
               </a:rPr>
-              <a:t>Manual files are intended for programmers and end users comfortable with programming.</a:t>
-            </a:r>
-          </a:p>
-          <a:p>
-            <a:r>
-              <a:rPr lang="en-US" dirty="0">
+              <a:t>Intro to Portfolio </a:t>
+            </a:r>
+            <a:r>
+              <a:rPr lang="en-US" dirty="0" smtClean="0">
                 <a:solidFill>
                   <a:schemeClr val="tx2"/>
                 </a:solidFill>
@@ -5956,10 +5928,12 @@
                 <a:ea typeface="Segoe UI" panose="020B0502040204020203" pitchFamily="34" charset="0"/>
                 <a:cs typeface="Segoe UI" panose="020B0502040204020203" pitchFamily="34" charset="0"/>
               </a:rPr>
-              <a:t>Manual files are accessed by typing ??FUNCTION_NAME or ??</a:t>
-            </a:r>
-            <a:r>
-              <a:rPr lang="en-US" dirty="0" err="1">
+              <a:t>Review.” </a:t>
+            </a:r>
+          </a:p>
+          <a:p>
+            <a:r>
+              <a:rPr lang="en-US" dirty="0" smtClean="0">
                 <a:solidFill>
                   <a:schemeClr val="tx2"/>
                 </a:solidFill>
@@ -5967,10 +5941,12 @@
                 <a:ea typeface="Segoe UI" panose="020B0502040204020203" pitchFamily="34" charset="0"/>
                 <a:cs typeface="Segoe UI" panose="020B0502040204020203" pitchFamily="34" charset="0"/>
               </a:rPr>
-              <a:t>eparTextTools</a:t>
-            </a:r>
-            <a:r>
-              <a:rPr lang="en-US" dirty="0">
+              <a:t>To do more complex topic modeling, read “Intro to Portfolio review FIRST, then “Intro to Topic Modeling. </a:t>
+            </a:r>
+          </a:p>
+          <a:p>
+            <a:r>
+              <a:rPr lang="en-US" dirty="0" smtClean="0">
                 <a:solidFill>
                   <a:schemeClr val="tx2"/>
                 </a:solidFill>
@@ -5978,10 +5954,10 @@
                 <a:ea typeface="Segoe UI" panose="020B0502040204020203" pitchFamily="34" charset="0"/>
                 <a:cs typeface="Segoe UI" panose="020B0502040204020203" pitchFamily="34" charset="0"/>
               </a:rPr>
-              <a:t>::FUNCTION_NAME at the </a:t>
-            </a:r>
-            <a:r>
-              <a:rPr lang="en-US" dirty="0" err="1">
+              <a:t>Those needing specific data from a large set of Word (.</a:t>
+            </a:r>
+            <a:r>
+              <a:rPr lang="en-US" dirty="0" err="1" smtClean="0">
                 <a:solidFill>
                   <a:schemeClr val="tx2"/>
                 </a:solidFill>
@@ -5989,10 +5965,10 @@
                 <a:ea typeface="Segoe UI" panose="020B0502040204020203" pitchFamily="34" charset="0"/>
                 <a:cs typeface="Segoe UI" panose="020B0502040204020203" pitchFamily="34" charset="0"/>
               </a:rPr>
-              <a:t>rstudio</a:t>
-            </a:r>
-            <a:r>
-              <a:rPr lang="en-US" dirty="0">
+              <a:t>docx</a:t>
+            </a:r>
+            <a:r>
+              <a:rPr lang="en-US" dirty="0" smtClean="0">
                 <a:solidFill>
                   <a:schemeClr val="tx2"/>
                 </a:solidFill>
@@ -6000,8 +5976,56 @@
                 <a:ea typeface="Segoe UI" panose="020B0502040204020203" pitchFamily="34" charset="0"/>
                 <a:cs typeface="Segoe UI" panose="020B0502040204020203" pitchFamily="34" charset="0"/>
               </a:rPr>
-              <a:t> console</a:t>
-            </a:r>
+              <a:t>) or html files should read “Extracting from Forms”</a:t>
+            </a:r>
+          </a:p>
+          <a:p>
+            <a:r>
+              <a:rPr lang="en-US" dirty="0" smtClean="0">
+                <a:solidFill>
+                  <a:schemeClr val="tx2"/>
+                </a:solidFill>
+                <a:latin typeface="Segoe UI" panose="020B0502040204020203" pitchFamily="34" charset="0"/>
+                <a:ea typeface="Segoe UI" panose="020B0502040204020203" pitchFamily="34" charset="0"/>
+                <a:cs typeface="Segoe UI" panose="020B0502040204020203" pitchFamily="34" charset="0"/>
+              </a:rPr>
+              <a:t>Future developers should read all of these documents, including the last one, “</a:t>
+            </a:r>
+            <a:r>
+              <a:rPr lang="en-US" dirty="0" err="1" smtClean="0">
+                <a:solidFill>
+                  <a:schemeClr val="tx2"/>
+                </a:solidFill>
+                <a:latin typeface="Segoe UI" panose="020B0502040204020203" pitchFamily="34" charset="0"/>
+                <a:ea typeface="Segoe UI" panose="020B0502040204020203" pitchFamily="34" charset="0"/>
+                <a:cs typeface="Segoe UI" panose="020B0502040204020203" pitchFamily="34" charset="0"/>
+              </a:rPr>
+              <a:t>GoogleDirections</a:t>
+            </a:r>
+            <a:r>
+              <a:rPr lang="en-US" dirty="0" smtClean="0">
+                <a:solidFill>
+                  <a:schemeClr val="tx2"/>
+                </a:solidFill>
+                <a:latin typeface="Segoe UI" panose="020B0502040204020203" pitchFamily="34" charset="0"/>
+                <a:ea typeface="Segoe UI" panose="020B0502040204020203" pitchFamily="34" charset="0"/>
+                <a:cs typeface="Segoe UI" panose="020B0502040204020203" pitchFamily="34" charset="0"/>
+              </a:rPr>
+              <a:t>”</a:t>
+            </a:r>
+          </a:p>
+          <a:p>
+            <a:pPr marL="0" indent="0">
+              <a:buNone/>
+            </a:pPr>
+            <a:endParaRPr lang="en-US" dirty="0">
+              <a:solidFill>
+                <a:schemeClr val="tx2"/>
+              </a:solidFill>
+              <a:latin typeface="Segoe UI" panose="020B0502040204020203" pitchFamily="34" charset="0"/>
+              <a:ea typeface="Segoe UI" panose="020B0502040204020203" pitchFamily="34" charset="0"/>
+              <a:cs typeface="Segoe UI" panose="020B0502040204020203" pitchFamily="34" charset="0"/>
+            </a:endParaRPr>
           </a:p>
         </p:txBody>
       </p:sp>
@@ -6172,6 +6196,376 @@
                 <a:solidFill>
                   <a:schemeClr val="tx2"/>
                 </a:solidFill>
+                <a:latin typeface="Trebuchet MS" panose="020B0603020202020204" pitchFamily="34" charset="0"/>
+              </a:rPr>
+              <a:t>Vignettes (cont.)</a:t>
+            </a:r>
+            <a:endParaRPr lang="en-US" b="0" dirty="0">
+              <a:solidFill>
+                <a:schemeClr val="tx2"/>
+              </a:solidFill>
+              <a:latin typeface="Trebuchet MS" panose="020B0603020202020204" pitchFamily="34" charset="0"/>
+            </a:endParaRPr>
+          </a:p>
+        </p:txBody>
+      </p:sp>
+    </p:spTree>
+    <p:extLst>
+      <p:ext uri="{BB962C8B-B14F-4D97-AF65-F5344CB8AC3E}">
+        <p14:creationId xmlns:p14="http://schemas.microsoft.com/office/powerpoint/2010/main" val="1815522702"/>
+      </p:ext>
+    </p:extLst>
+  </p:cSld>
+  <p:clrMapOvr>
+    <a:masterClrMapping/>
+  </p:clrMapOvr>
+</p:sld>
+</file>
+
+<file path=ppt/slides/slide5.xml><?xml version="1.0" encoding="utf-8"?>
+<p:sld xmlns:a="http://schemas.openxmlformats.org/drawingml/2006/main" xmlns:r="http://schemas.openxmlformats.org/officeDocument/2006/relationships" xmlns:p="http://schemas.openxmlformats.org/presentationml/2006/main">
+  <p:cSld>
+    <p:spTree>
+      <p:nvGrpSpPr>
+        <p:cNvPr id="1" name=""/>
+        <p:cNvGrpSpPr/>
+        <p:nvPr/>
+      </p:nvGrpSpPr>
+      <p:grpSpPr>
+        <a:xfrm>
+          <a:off x="0" y="0"/>
+          <a:ext cx="0" cy="0"/>
+          <a:chOff x="0" y="0"/>
+          <a:chExt cx="0" cy="0"/>
+        </a:xfrm>
+      </p:grpSpPr>
+      <p:sp>
+        <p:nvSpPr>
+          <p:cNvPr id="2" name="Text Placeholder 1"/>
+          <p:cNvSpPr>
+            <a:spLocks noGrp="1"/>
+          </p:cNvSpPr>
+          <p:nvPr>
+            <p:ph type="body" sz="quarter" idx="10"/>
+          </p:nvPr>
+        </p:nvSpPr>
+        <p:spPr>
+          <a:xfrm>
+            <a:off x="659305" y="281386"/>
+            <a:ext cx="8184662" cy="991998"/>
+          </a:xfrm>
+        </p:spPr>
+        <p:txBody>
+          <a:bodyPr/>
+          <a:lstStyle/>
+          <a:p>
+            <a:r>
+              <a:rPr lang="en-US" dirty="0" smtClean="0">
+                <a:solidFill>
+                  <a:schemeClr val="accent3"/>
+                </a:solidFill>
+                <a:latin typeface="Trebuchet MS" panose="020B0603020202020204" pitchFamily="34" charset="0"/>
+              </a:rPr>
+              <a:t>Documentation </a:t>
+            </a:r>
+            <a:r>
+              <a:rPr lang="en-US" dirty="0">
+                <a:solidFill>
+                  <a:schemeClr val="accent3"/>
+                </a:solidFill>
+                <a:latin typeface="Trebuchet MS" panose="020B0603020202020204" pitchFamily="34" charset="0"/>
+              </a:rPr>
+              <a:t>Available</a:t>
+            </a:r>
+            <a:r>
+              <a:rPr lang="en-US" dirty="0" smtClean="0">
+                <a:solidFill>
+                  <a:schemeClr val="accent3"/>
+                </a:solidFill>
+                <a:latin typeface="Trebuchet MS" panose="020B0603020202020204" pitchFamily="34" charset="0"/>
+              </a:rPr>
+              <a:t>:</a:t>
+            </a:r>
+            <a:endParaRPr lang="en-US" dirty="0">
+              <a:solidFill>
+                <a:schemeClr val="accent3"/>
+              </a:solidFill>
+              <a:latin typeface="Trebuchet MS" panose="020B0603020202020204" pitchFamily="34" charset="0"/>
+            </a:endParaRPr>
+          </a:p>
+        </p:txBody>
+      </p:sp>
+      <p:sp>
+        <p:nvSpPr>
+          <p:cNvPr id="3" name="Text Placeholder 2"/>
+          <p:cNvSpPr>
+            <a:spLocks noGrp="1"/>
+          </p:cNvSpPr>
+          <p:nvPr>
+            <p:ph type="body" sz="quarter" idx="11"/>
+          </p:nvPr>
+        </p:nvSpPr>
+        <p:spPr>
+          <a:xfrm>
+            <a:off x="659305" y="2187147"/>
+            <a:ext cx="8076956" cy="4275976"/>
+          </a:xfrm>
+        </p:spPr>
+        <p:txBody>
+          <a:bodyPr/>
+          <a:lstStyle/>
+          <a:p>
+            <a:r>
+              <a:rPr lang="en-US" dirty="0">
+                <a:solidFill>
+                  <a:schemeClr val="tx2"/>
+                </a:solidFill>
+                <a:latin typeface="Segoe UI" panose="020B0502040204020203" pitchFamily="34" charset="0"/>
+                <a:ea typeface="Segoe UI" panose="020B0502040204020203" pitchFamily="34" charset="0"/>
+                <a:cs typeface="Segoe UI" panose="020B0502040204020203" pitchFamily="34" charset="0"/>
+              </a:rPr>
+              <a:t>Manual Files are documentation for programmers looking to extend the tools, or for power users who want to understand what each function does, better.</a:t>
+            </a:r>
+          </a:p>
+          <a:p>
+            <a:r>
+              <a:rPr lang="en-US" dirty="0">
+                <a:solidFill>
+                  <a:schemeClr val="tx2"/>
+                </a:solidFill>
+                <a:latin typeface="Segoe UI" panose="020B0502040204020203" pitchFamily="34" charset="0"/>
+                <a:ea typeface="Segoe UI" panose="020B0502040204020203" pitchFamily="34" charset="0"/>
+                <a:cs typeface="Segoe UI" panose="020B0502040204020203" pitchFamily="34" charset="0"/>
+              </a:rPr>
+              <a:t>Manual files are intended for programmers and end users comfortable with programming.</a:t>
+            </a:r>
+          </a:p>
+          <a:p>
+            <a:r>
+              <a:rPr lang="en-US" dirty="0">
+                <a:solidFill>
+                  <a:schemeClr val="tx2"/>
+                </a:solidFill>
+                <a:latin typeface="Segoe UI" panose="020B0502040204020203" pitchFamily="34" charset="0"/>
+                <a:ea typeface="Segoe UI" panose="020B0502040204020203" pitchFamily="34" charset="0"/>
+                <a:cs typeface="Segoe UI" panose="020B0502040204020203" pitchFamily="34" charset="0"/>
+              </a:rPr>
+              <a:t>Manual files are accessed by typing ??FUNCTION_NAME or ??</a:t>
+            </a:r>
+            <a:r>
+              <a:rPr lang="en-US" dirty="0" err="1">
+                <a:solidFill>
+                  <a:schemeClr val="tx2"/>
+                </a:solidFill>
+                <a:latin typeface="Segoe UI" panose="020B0502040204020203" pitchFamily="34" charset="0"/>
+                <a:ea typeface="Segoe UI" panose="020B0502040204020203" pitchFamily="34" charset="0"/>
+                <a:cs typeface="Segoe UI" panose="020B0502040204020203" pitchFamily="34" charset="0"/>
+              </a:rPr>
+              <a:t>eparTextTools</a:t>
+            </a:r>
+            <a:r>
+              <a:rPr lang="en-US" dirty="0">
+                <a:solidFill>
+                  <a:schemeClr val="tx2"/>
+                </a:solidFill>
+                <a:latin typeface="Segoe UI" panose="020B0502040204020203" pitchFamily="34" charset="0"/>
+                <a:ea typeface="Segoe UI" panose="020B0502040204020203" pitchFamily="34" charset="0"/>
+                <a:cs typeface="Segoe UI" panose="020B0502040204020203" pitchFamily="34" charset="0"/>
+              </a:rPr>
+              <a:t>::FUNCTION_NAME at the </a:t>
+            </a:r>
+            <a:r>
+              <a:rPr lang="en-US" dirty="0" err="1">
+                <a:solidFill>
+                  <a:schemeClr val="tx2"/>
+                </a:solidFill>
+                <a:latin typeface="Segoe UI" panose="020B0502040204020203" pitchFamily="34" charset="0"/>
+                <a:ea typeface="Segoe UI" panose="020B0502040204020203" pitchFamily="34" charset="0"/>
+                <a:cs typeface="Segoe UI" panose="020B0502040204020203" pitchFamily="34" charset="0"/>
+              </a:rPr>
+              <a:t>rstudio</a:t>
+            </a:r>
+            <a:r>
+              <a:rPr lang="en-US" dirty="0">
+                <a:solidFill>
+                  <a:schemeClr val="tx2"/>
+                </a:solidFill>
+                <a:latin typeface="Segoe UI" panose="020B0502040204020203" pitchFamily="34" charset="0"/>
+                <a:ea typeface="Segoe UI" panose="020B0502040204020203" pitchFamily="34" charset="0"/>
+                <a:cs typeface="Segoe UI" panose="020B0502040204020203" pitchFamily="34" charset="0"/>
+              </a:rPr>
+              <a:t> console</a:t>
+            </a:r>
+          </a:p>
+        </p:txBody>
+      </p:sp>
+      <p:sp>
+        <p:nvSpPr>
+          <p:cNvPr id="4" name="Text Placeholder 2"/>
+          <p:cNvSpPr txBox="1">
+            <a:spLocks/>
+          </p:cNvSpPr>
+          <p:nvPr/>
+        </p:nvSpPr>
+        <p:spPr>
+          <a:xfrm>
+            <a:off x="659305" y="1645285"/>
+            <a:ext cx="8076956" cy="4015497"/>
+          </a:xfrm>
+          <a:prstGeom prst="rect">
+            <a:avLst/>
+          </a:prstGeom>
+        </p:spPr>
+        <p:txBody>
+          <a:bodyPr/>
+          <a:lstStyle>
+            <a:lvl1pPr marL="342900" indent="-342900" algn="l" defTabSz="457200" rtl="0" eaLnBrk="1" latinLnBrk="0" hangingPunct="1">
+              <a:spcBef>
+                <a:spcPct val="20000"/>
+              </a:spcBef>
+              <a:buFont typeface="Lucida Grande"/>
+              <a:buChar char="&gt;"/>
+              <a:defRPr sz="2400" b="1" i="0" kern="1200" baseline="0">
+                <a:solidFill>
+                  <a:srgbClr val="4B2E83"/>
+                </a:solidFill>
+                <a:latin typeface="Open Sans"/>
+                <a:ea typeface="+mn-ea"/>
+                <a:cs typeface="Open Sans"/>
+              </a:defRPr>
+            </a:lvl1pPr>
+            <a:lvl2pPr marL="742950" indent="-285750" algn="l" defTabSz="457200" rtl="0" eaLnBrk="1" latinLnBrk="0" hangingPunct="1">
+              <a:spcBef>
+                <a:spcPct val="20000"/>
+              </a:spcBef>
+              <a:buFont typeface="Arial"/>
+              <a:buChar char="–"/>
+              <a:defRPr sz="2000" b="1" i="0" kern="1200" baseline="0">
+                <a:solidFill>
+                  <a:srgbClr val="4B2E83"/>
+                </a:solidFill>
+                <a:latin typeface="Open Sans"/>
+                <a:ea typeface="+mn-ea"/>
+                <a:cs typeface="Open Sans"/>
+              </a:defRPr>
+            </a:lvl2pPr>
+            <a:lvl3pPr marL="1143000" indent="-228600" algn="l" defTabSz="457200" rtl="0" eaLnBrk="1" latinLnBrk="0" hangingPunct="1">
+              <a:spcBef>
+                <a:spcPct val="20000"/>
+              </a:spcBef>
+              <a:buSzPct val="100000"/>
+              <a:buFont typeface="Lucida Grande"/>
+              <a:buChar char="&gt;"/>
+              <a:defRPr sz="1800" b="1" i="0" kern="1200" baseline="0">
+                <a:solidFill>
+                  <a:srgbClr val="4B2E83"/>
+                </a:solidFill>
+                <a:latin typeface="Open Sans"/>
+                <a:ea typeface="+mn-ea"/>
+                <a:cs typeface="Open Sans"/>
+              </a:defRPr>
+            </a:lvl3pPr>
+            <a:lvl4pPr marL="1600200" indent="-228600" algn="l" defTabSz="457200" rtl="0" eaLnBrk="1" latinLnBrk="0" hangingPunct="1">
+              <a:spcBef>
+                <a:spcPct val="20000"/>
+              </a:spcBef>
+              <a:buFont typeface="Arial"/>
+              <a:buChar char="–"/>
+              <a:defRPr sz="1600" b="1" i="0" kern="1200" baseline="0">
+                <a:solidFill>
+                  <a:srgbClr val="4B2E83"/>
+                </a:solidFill>
+                <a:latin typeface="Open Sans"/>
+                <a:ea typeface="+mn-ea"/>
+                <a:cs typeface="Open Sans"/>
+              </a:defRPr>
+            </a:lvl4pPr>
+            <a:lvl5pPr marL="2057400" indent="-228600" algn="l" defTabSz="457200" rtl="0" eaLnBrk="1" latinLnBrk="0" hangingPunct="1">
+              <a:spcBef>
+                <a:spcPct val="20000"/>
+              </a:spcBef>
+              <a:buFont typeface="Lucida Grande"/>
+              <a:buChar char="&gt;"/>
+              <a:defRPr sz="1400" b="1" i="0" kern="1200" baseline="0">
+                <a:solidFill>
+                  <a:srgbClr val="4B2E83"/>
+                </a:solidFill>
+                <a:latin typeface="Open Sans"/>
+                <a:ea typeface="+mn-ea"/>
+                <a:cs typeface="Open Sans"/>
+              </a:defRPr>
+            </a:lvl5pPr>
+            <a:lvl6pPr marL="2514600" indent="-228600" algn="l" defTabSz="457200" rtl="0" eaLnBrk="1" latinLnBrk="0" hangingPunct="1">
+              <a:spcBef>
+                <a:spcPct val="20000"/>
+              </a:spcBef>
+              <a:buFont typeface="Arial"/>
+              <a:buChar char="•"/>
+              <a:defRPr sz="2000" kern="1200">
+                <a:solidFill>
+                  <a:schemeClr val="tx1"/>
+                </a:solidFill>
+                <a:latin typeface="+mn-lt"/>
+                <a:ea typeface="+mn-ea"/>
+                <a:cs typeface="+mn-cs"/>
+              </a:defRPr>
+            </a:lvl6pPr>
+            <a:lvl7pPr marL="2971800" indent="-228600" algn="l" defTabSz="457200" rtl="0" eaLnBrk="1" latinLnBrk="0" hangingPunct="1">
+              <a:spcBef>
+                <a:spcPct val="20000"/>
+              </a:spcBef>
+              <a:buFont typeface="Arial"/>
+              <a:buChar char="•"/>
+              <a:defRPr sz="2000" kern="1200">
+                <a:solidFill>
+                  <a:schemeClr val="tx1"/>
+                </a:solidFill>
+                <a:latin typeface="+mn-lt"/>
+                <a:ea typeface="+mn-ea"/>
+                <a:cs typeface="+mn-cs"/>
+              </a:defRPr>
+            </a:lvl7pPr>
+            <a:lvl8pPr marL="3429000" indent="-228600" algn="l" defTabSz="457200" rtl="0" eaLnBrk="1" latinLnBrk="0" hangingPunct="1">
+              <a:spcBef>
+                <a:spcPct val="20000"/>
+              </a:spcBef>
+              <a:buFont typeface="Arial"/>
+              <a:buChar char="•"/>
+              <a:defRPr sz="2000" kern="1200">
+                <a:solidFill>
+                  <a:schemeClr val="tx1"/>
+                </a:solidFill>
+                <a:latin typeface="+mn-lt"/>
+                <a:ea typeface="+mn-ea"/>
+                <a:cs typeface="+mn-cs"/>
+              </a:defRPr>
+            </a:lvl8pPr>
+            <a:lvl9pPr marL="3886200" indent="-228600" algn="l" defTabSz="457200" rtl="0" eaLnBrk="1" latinLnBrk="0" hangingPunct="1">
+              <a:spcBef>
+                <a:spcPct val="20000"/>
+              </a:spcBef>
+              <a:buFont typeface="Arial"/>
+              <a:buChar char="•"/>
+              <a:defRPr sz="2000" kern="1200">
+                <a:solidFill>
+                  <a:schemeClr val="tx1"/>
+                </a:solidFill>
+                <a:latin typeface="+mn-lt"/>
+                <a:ea typeface="+mn-ea"/>
+                <a:cs typeface="+mn-cs"/>
+              </a:defRPr>
+            </a:lvl9pPr>
+          </a:lstStyle>
+          <a:p>
+            <a:pPr marL="0" indent="0">
+              <a:buFont typeface="Lucida Grande"/>
+              <a:buNone/>
+            </a:pPr>
+            <a:r>
+              <a:rPr lang="en-US" b="0" dirty="0" smtClean="0">
+                <a:solidFill>
+                  <a:schemeClr val="tx2"/>
+                </a:solidFill>
                 <a:latin typeface="Segoe UI" panose="020B0502040204020203" pitchFamily="34" charset="0"/>
                 <a:ea typeface="Segoe UI" panose="020B0502040204020203" pitchFamily="34" charset="0"/>
                 <a:cs typeface="Segoe UI" panose="020B0502040204020203" pitchFamily="34" charset="0"/>
@@ -6202,7 +6596,7 @@
 </p:sld>
 </file>
 
-<file path=ppt/slides/slide5.xml><?xml version="1.0" encoding="utf-8"?>
+<file path=ppt/slides/slide6.xml><?xml version="1.0" encoding="utf-8"?>
 <p:sld xmlns:a="http://schemas.openxmlformats.org/drawingml/2006/main" xmlns:r="http://schemas.openxmlformats.org/officeDocument/2006/relationships" xmlns:p="http://schemas.openxmlformats.org/presentationml/2006/main">
   <p:cSld>
     <p:spTree>

</xml_diff>